<commit_message>
slides and github tutorial links
</commit_message>
<xml_diff>
--- a/umd_slides.pptx
+++ b/umd_slides.pptx
@@ -5,7 +5,7 @@
     <p:sldMasterId id="2147483648" r:id="rId1"/>
   </p:sldMasterIdLst>
   <p:notesMasterIdLst>
-    <p:notesMasterId r:id="rId13"/>
+    <p:notesMasterId r:id="rId15"/>
   </p:notesMasterIdLst>
   <p:sldIdLst>
     <p:sldId id="258" r:id="rId2"/>
@@ -19,6 +19,8 @@
     <p:sldId id="265" r:id="rId10"/>
     <p:sldId id="269" r:id="rId11"/>
     <p:sldId id="271" r:id="rId12"/>
+    <p:sldId id="272" r:id="rId13"/>
+    <p:sldId id="273" r:id="rId14"/>
   </p:sldIdLst>
   <p:sldSz cx="9144000" cy="6858000" type="screen4x3"/>
   <p:notesSz cx="6858000" cy="9144000"/>
@@ -554,6 +556,184 @@
 </p:notes>
 </file>
 
+<file path=ppt/notesSlides/notesSlide10.xml><?xml version="1.0" encoding="utf-8"?>
+<p:notes xmlns:a="http://schemas.openxmlformats.org/drawingml/2006/main" xmlns:r="http://schemas.openxmlformats.org/officeDocument/2006/relationships" xmlns:p="http://schemas.openxmlformats.org/presentationml/2006/main">
+  <p:cSld>
+    <p:spTree>
+      <p:nvGrpSpPr>
+        <p:cNvPr id="1" name=""/>
+        <p:cNvGrpSpPr/>
+        <p:nvPr/>
+      </p:nvGrpSpPr>
+      <p:grpSpPr>
+        <a:xfrm>
+          <a:off x="0" y="0"/>
+          <a:ext cx="0" cy="0"/>
+          <a:chOff x="0" y="0"/>
+          <a:chExt cx="0" cy="0"/>
+        </a:xfrm>
+      </p:grpSpPr>
+      <p:sp>
+        <p:nvSpPr>
+          <p:cNvPr id="2" name="Slide Image Placeholder 1"/>
+          <p:cNvSpPr>
+            <a:spLocks noGrp="1" noRot="1" noChangeAspect="1"/>
+          </p:cNvSpPr>
+          <p:nvPr>
+            <p:ph type="sldImg"/>
+          </p:nvPr>
+        </p:nvSpPr>
+        <p:spPr/>
+      </p:sp>
+      <p:sp>
+        <p:nvSpPr>
+          <p:cNvPr id="3" name="Notes Placeholder 2"/>
+          <p:cNvSpPr>
+            <a:spLocks noGrp="1"/>
+          </p:cNvSpPr>
+          <p:nvPr>
+            <p:ph type="body" idx="1"/>
+          </p:nvPr>
+        </p:nvSpPr>
+        <p:spPr/>
+        <p:txBody>
+          <a:bodyPr/>
+          <a:lstStyle/>
+          <a:p>
+            <a:r>
+              <a:rPr lang="en-US" dirty="0" smtClean="0"/>
+              <a:t>In many newsrooms</a:t>
+            </a:r>
+            <a:r>
+              <a:rPr lang="en-US" baseline="0" dirty="0" smtClean="0"/>
+              <a:t> or other orgs, this is the question you’re going to encounter.</a:t>
+            </a:r>
+          </a:p>
+          <a:p>
+            <a:endParaRPr lang="en-US" dirty="0"/>
+          </a:p>
+        </p:txBody>
+      </p:sp>
+      <p:sp>
+        <p:nvSpPr>
+          <p:cNvPr id="4" name="Slide Number Placeholder 3"/>
+          <p:cNvSpPr>
+            <a:spLocks noGrp="1"/>
+          </p:cNvSpPr>
+          <p:nvPr>
+            <p:ph type="sldNum" sz="quarter" idx="10"/>
+          </p:nvPr>
+        </p:nvSpPr>
+        <p:spPr/>
+        <p:txBody>
+          <a:bodyPr/>
+          <a:lstStyle/>
+          <a:p>
+            <a:fld id="{02BCBBC8-CD0A-A54F-B7AC-46686CC7898C}" type="slidenum">
+              <a:rPr lang="en-US" smtClean="0"/>
+              <a:t>12</a:t>
+            </a:fld>
+            <a:endParaRPr lang="en-US"/>
+          </a:p>
+        </p:txBody>
+      </p:sp>
+    </p:spTree>
+    <p:extLst>
+      <p:ext uri="{BB962C8B-B14F-4D97-AF65-F5344CB8AC3E}">
+        <p14:creationId xmlns:p14="http://schemas.microsoft.com/office/powerpoint/2010/main" val="3758321938"/>
+      </p:ext>
+    </p:extLst>
+  </p:cSld>
+  <p:clrMapOvr>
+    <a:masterClrMapping/>
+  </p:clrMapOvr>
+</p:notes>
+</file>
+
+<file path=ppt/notesSlides/notesSlide11.xml><?xml version="1.0" encoding="utf-8"?>
+<p:notes xmlns:a="http://schemas.openxmlformats.org/drawingml/2006/main" xmlns:r="http://schemas.openxmlformats.org/officeDocument/2006/relationships" xmlns:p="http://schemas.openxmlformats.org/presentationml/2006/main">
+  <p:cSld>
+    <p:spTree>
+      <p:nvGrpSpPr>
+        <p:cNvPr id="1" name=""/>
+        <p:cNvGrpSpPr/>
+        <p:nvPr/>
+      </p:nvGrpSpPr>
+      <p:grpSpPr>
+        <a:xfrm>
+          <a:off x="0" y="0"/>
+          <a:ext cx="0" cy="0"/>
+          <a:chOff x="0" y="0"/>
+          <a:chExt cx="0" cy="0"/>
+        </a:xfrm>
+      </p:grpSpPr>
+      <p:sp>
+        <p:nvSpPr>
+          <p:cNvPr id="2" name="Slide Image Placeholder 1"/>
+          <p:cNvSpPr>
+            <a:spLocks noGrp="1" noRot="1" noChangeAspect="1"/>
+          </p:cNvSpPr>
+          <p:nvPr>
+            <p:ph type="sldImg"/>
+          </p:nvPr>
+        </p:nvSpPr>
+        <p:spPr/>
+      </p:sp>
+      <p:sp>
+        <p:nvSpPr>
+          <p:cNvPr id="3" name="Notes Placeholder 2"/>
+          <p:cNvSpPr>
+            <a:spLocks noGrp="1"/>
+          </p:cNvSpPr>
+          <p:nvPr>
+            <p:ph type="body" idx="1"/>
+          </p:nvPr>
+        </p:nvSpPr>
+        <p:spPr/>
+        <p:txBody>
+          <a:bodyPr/>
+          <a:lstStyle/>
+          <a:p>
+            <a:endParaRPr lang="en-US" dirty="0"/>
+          </a:p>
+        </p:txBody>
+      </p:sp>
+      <p:sp>
+        <p:nvSpPr>
+          <p:cNvPr id="4" name="Slide Number Placeholder 3"/>
+          <p:cNvSpPr>
+            <a:spLocks noGrp="1"/>
+          </p:cNvSpPr>
+          <p:nvPr>
+            <p:ph type="sldNum" sz="quarter" idx="10"/>
+          </p:nvPr>
+        </p:nvSpPr>
+        <p:spPr/>
+        <p:txBody>
+          <a:bodyPr/>
+          <a:lstStyle/>
+          <a:p>
+            <a:fld id="{02BCBBC8-CD0A-A54F-B7AC-46686CC7898C}" type="slidenum">
+              <a:rPr lang="en-US" smtClean="0"/>
+              <a:t>13</a:t>
+            </a:fld>
+            <a:endParaRPr lang="en-US"/>
+          </a:p>
+        </p:txBody>
+      </p:sp>
+    </p:spTree>
+    <p:extLst>
+      <p:ext uri="{BB962C8B-B14F-4D97-AF65-F5344CB8AC3E}">
+        <p14:creationId xmlns:p14="http://schemas.microsoft.com/office/powerpoint/2010/main" val="2683069782"/>
+      </p:ext>
+    </p:extLst>
+  </p:cSld>
+  <p:clrMapOvr>
+    <a:masterClrMapping/>
+  </p:clrMapOvr>
+</p:notes>
+</file>
+
 <file path=ppt/notesSlides/notesSlide2.xml><?xml version="1.0" encoding="utf-8"?>
 <p:notes xmlns:a="http://schemas.openxmlformats.org/drawingml/2006/main" xmlns:r="http://schemas.openxmlformats.org/officeDocument/2006/relationships" xmlns:p="http://schemas.openxmlformats.org/presentationml/2006/main">
   <p:cSld>
@@ -1033,10 +1213,9 @@
               <a:t>linux</a:t>
             </a:r>
             <a:r>
-              <a:rPr lang="en-US" baseline="0" smtClean="0"/>
+              <a:rPr lang="en-US" baseline="0" dirty="0" smtClean="0"/>
               <a:t> code</a:t>
             </a:r>
-            <a:endParaRPr lang="en-US" baseline="0" dirty="0" smtClean="0"/>
           </a:p>
         </p:txBody>
       </p:sp>
@@ -1067,6 +1246,467 @@
     <p:extLst>
       <p:ext uri="{BB962C8B-B14F-4D97-AF65-F5344CB8AC3E}">
         <p14:creationId xmlns:p14="http://schemas.microsoft.com/office/powerpoint/2010/main" val="1340083156"/>
+      </p:ext>
+    </p:extLst>
+  </p:cSld>
+  <p:clrMapOvr>
+    <a:masterClrMapping/>
+  </p:clrMapOvr>
+</p:notes>
+</file>
+
+<file path=ppt/notesSlides/notesSlide6.xml><?xml version="1.0" encoding="utf-8"?>
+<p:notes xmlns:a="http://schemas.openxmlformats.org/drawingml/2006/main" xmlns:r="http://schemas.openxmlformats.org/officeDocument/2006/relationships" xmlns:p="http://schemas.openxmlformats.org/presentationml/2006/main">
+  <p:cSld>
+    <p:spTree>
+      <p:nvGrpSpPr>
+        <p:cNvPr id="1" name=""/>
+        <p:cNvGrpSpPr/>
+        <p:nvPr/>
+      </p:nvGrpSpPr>
+      <p:grpSpPr>
+        <a:xfrm>
+          <a:off x="0" y="0"/>
+          <a:ext cx="0" cy="0"/>
+          <a:chOff x="0" y="0"/>
+          <a:chExt cx="0" cy="0"/>
+        </a:xfrm>
+      </p:grpSpPr>
+      <p:sp>
+        <p:nvSpPr>
+          <p:cNvPr id="2" name="Slide Image Placeholder 1"/>
+          <p:cNvSpPr>
+            <a:spLocks noGrp="1" noRot="1" noChangeAspect="1"/>
+          </p:cNvSpPr>
+          <p:nvPr>
+            <p:ph type="sldImg"/>
+          </p:nvPr>
+        </p:nvSpPr>
+        <p:spPr/>
+      </p:sp>
+      <p:sp>
+        <p:nvSpPr>
+          <p:cNvPr id="3" name="Notes Placeholder 2"/>
+          <p:cNvSpPr>
+            <a:spLocks noGrp="1"/>
+          </p:cNvSpPr>
+          <p:nvPr>
+            <p:ph type="body" idx="1"/>
+          </p:nvPr>
+        </p:nvSpPr>
+        <p:spPr/>
+        <p:txBody>
+          <a:bodyPr/>
+          <a:lstStyle/>
+          <a:p>
+            <a:r>
+              <a:rPr lang="en-US" dirty="0" smtClean="0"/>
+              <a:t>For many, </a:t>
+            </a:r>
+            <a:r>
+              <a:rPr lang="en-US" dirty="0" err="1" smtClean="0"/>
+              <a:t>git</a:t>
+            </a:r>
+            <a:r>
+              <a:rPr lang="en-US" dirty="0" smtClean="0"/>
+              <a:t> (and </a:t>
+            </a:r>
+            <a:r>
+              <a:rPr lang="en-US" dirty="0" err="1" smtClean="0"/>
+              <a:t>github</a:t>
+            </a:r>
+            <a:r>
+              <a:rPr lang="en-US" dirty="0" smtClean="0"/>
+              <a:t>) are semi-synonymous</a:t>
+            </a:r>
+            <a:r>
+              <a:rPr lang="en-US" baseline="0" dirty="0" smtClean="0"/>
+              <a:t> w/ FOSS.</a:t>
+            </a:r>
+          </a:p>
+          <a:p>
+            <a:endParaRPr lang="en-US" baseline="0" dirty="0" smtClean="0"/>
+          </a:p>
+          <a:p>
+            <a:r>
+              <a:rPr lang="en-US" baseline="0" dirty="0" smtClean="0"/>
+              <a:t>Private </a:t>
+            </a:r>
+            <a:r>
+              <a:rPr lang="en-US" baseline="0" dirty="0" err="1" smtClean="0"/>
+              <a:t>github</a:t>
+            </a:r>
+            <a:r>
+              <a:rPr lang="en-US" baseline="0" dirty="0" smtClean="0"/>
+              <a:t> also exists (plus </a:t>
+            </a:r>
+            <a:r>
+              <a:rPr lang="en-US" baseline="0" dirty="0" err="1" smtClean="0"/>
+              <a:t>bitbucket</a:t>
+            </a:r>
+            <a:r>
+              <a:rPr lang="en-US" baseline="0" dirty="0" smtClean="0"/>
+              <a:t> </a:t>
+            </a:r>
+            <a:r>
+              <a:rPr lang="en-US" baseline="0" dirty="0" err="1" smtClean="0"/>
+              <a:t>etc</a:t>
+            </a:r>
+            <a:r>
+              <a:rPr lang="en-US" baseline="0" dirty="0" smtClean="0"/>
+              <a:t>) and is used in many newsrooms/ by most </a:t>
+            </a:r>
+            <a:r>
+              <a:rPr lang="en-US" baseline="0" dirty="0" err="1" smtClean="0"/>
+              <a:t>devs</a:t>
+            </a:r>
+            <a:endParaRPr lang="en-US" baseline="0" dirty="0" smtClean="0"/>
+          </a:p>
+          <a:p>
+            <a:endParaRPr lang="en-US" baseline="0" dirty="0" smtClean="0"/>
+          </a:p>
+          <a:p>
+            <a:endParaRPr lang="en-US" dirty="0"/>
+          </a:p>
+        </p:txBody>
+      </p:sp>
+      <p:sp>
+        <p:nvSpPr>
+          <p:cNvPr id="4" name="Slide Number Placeholder 3"/>
+          <p:cNvSpPr>
+            <a:spLocks noGrp="1"/>
+          </p:cNvSpPr>
+          <p:nvPr>
+            <p:ph type="sldNum" sz="quarter" idx="10"/>
+          </p:nvPr>
+        </p:nvSpPr>
+        <p:spPr/>
+        <p:txBody>
+          <a:bodyPr/>
+          <a:lstStyle/>
+          <a:p>
+            <a:fld id="{02BCBBC8-CD0A-A54F-B7AC-46686CC7898C}" type="slidenum">
+              <a:rPr lang="en-US" smtClean="0"/>
+              <a:t>8</a:t>
+            </a:fld>
+            <a:endParaRPr lang="en-US"/>
+          </a:p>
+        </p:txBody>
+      </p:sp>
+    </p:spTree>
+    <p:extLst>
+      <p:ext uri="{BB962C8B-B14F-4D97-AF65-F5344CB8AC3E}">
+        <p14:creationId xmlns:p14="http://schemas.microsoft.com/office/powerpoint/2010/main" val="2586356331"/>
+      </p:ext>
+    </p:extLst>
+  </p:cSld>
+  <p:clrMapOvr>
+    <a:masterClrMapping/>
+  </p:clrMapOvr>
+</p:notes>
+</file>
+
+<file path=ppt/notesSlides/notesSlide7.xml><?xml version="1.0" encoding="utf-8"?>
+<p:notes xmlns:a="http://schemas.openxmlformats.org/drawingml/2006/main" xmlns:r="http://schemas.openxmlformats.org/officeDocument/2006/relationships" xmlns:p="http://schemas.openxmlformats.org/presentationml/2006/main">
+  <p:cSld>
+    <p:spTree>
+      <p:nvGrpSpPr>
+        <p:cNvPr id="1" name=""/>
+        <p:cNvGrpSpPr/>
+        <p:nvPr/>
+      </p:nvGrpSpPr>
+      <p:grpSpPr>
+        <a:xfrm>
+          <a:off x="0" y="0"/>
+          <a:ext cx="0" cy="0"/>
+          <a:chOff x="0" y="0"/>
+          <a:chExt cx="0" cy="0"/>
+        </a:xfrm>
+      </p:grpSpPr>
+      <p:sp>
+        <p:nvSpPr>
+          <p:cNvPr id="2" name="Slide Image Placeholder 1"/>
+          <p:cNvSpPr>
+            <a:spLocks noGrp="1" noRot="1" noChangeAspect="1"/>
+          </p:cNvSpPr>
+          <p:nvPr>
+            <p:ph type="sldImg"/>
+          </p:nvPr>
+        </p:nvSpPr>
+        <p:spPr/>
+      </p:sp>
+      <p:sp>
+        <p:nvSpPr>
+          <p:cNvPr id="3" name="Notes Placeholder 2"/>
+          <p:cNvSpPr>
+            <a:spLocks noGrp="1"/>
+          </p:cNvSpPr>
+          <p:nvPr>
+            <p:ph type="body" idx="1"/>
+          </p:nvPr>
+        </p:nvSpPr>
+        <p:spPr/>
+        <p:txBody>
+          <a:bodyPr/>
+          <a:lstStyle/>
+          <a:p>
+            <a:r>
+              <a:rPr lang="en-US" dirty="0" smtClean="0"/>
+              <a:t>Personal brand (ugh)</a:t>
+            </a:r>
+          </a:p>
+          <a:p>
+            <a:r>
+              <a:rPr lang="en-US" dirty="0" smtClean="0"/>
+              <a:t>Even</a:t>
+            </a:r>
+            <a:r>
+              <a:rPr lang="en-US" baseline="0" dirty="0" smtClean="0"/>
+              <a:t> if you’re not a </a:t>
+            </a:r>
+            <a:r>
+              <a:rPr lang="en-US" baseline="0" dirty="0" err="1" smtClean="0"/>
+              <a:t>dev</a:t>
+            </a:r>
+            <a:r>
+              <a:rPr lang="en-US" baseline="0" dirty="0" smtClean="0"/>
+              <a:t>, open source contributions look great to employers. Data heavy newsrooms or teams (</a:t>
+            </a:r>
+            <a:r>
+              <a:rPr lang="en-US" baseline="0" dirty="0" err="1" smtClean="0"/>
+              <a:t>Propublica</a:t>
+            </a:r>
+            <a:r>
+              <a:rPr lang="en-US" baseline="0" dirty="0" smtClean="0"/>
+              <a:t>, CIR, NPR, NYT) big into open source community</a:t>
+            </a:r>
+          </a:p>
+          <a:p>
+            <a:r>
+              <a:rPr lang="en-US" baseline="0" dirty="0" smtClean="0"/>
+              <a:t>Can help w/ internal office reputation and politics</a:t>
+            </a:r>
+            <a:endParaRPr lang="en-US" dirty="0"/>
+          </a:p>
+        </p:txBody>
+      </p:sp>
+      <p:sp>
+        <p:nvSpPr>
+          <p:cNvPr id="4" name="Slide Number Placeholder 3"/>
+          <p:cNvSpPr>
+            <a:spLocks noGrp="1"/>
+          </p:cNvSpPr>
+          <p:nvPr>
+            <p:ph type="sldNum" sz="quarter" idx="10"/>
+          </p:nvPr>
+        </p:nvSpPr>
+        <p:spPr/>
+        <p:txBody>
+          <a:bodyPr/>
+          <a:lstStyle/>
+          <a:p>
+            <a:fld id="{02BCBBC8-CD0A-A54F-B7AC-46686CC7898C}" type="slidenum">
+              <a:rPr lang="en-US" smtClean="0"/>
+              <a:t>9</a:t>
+            </a:fld>
+            <a:endParaRPr lang="en-US"/>
+          </a:p>
+        </p:txBody>
+      </p:sp>
+    </p:spTree>
+    <p:extLst>
+      <p:ext uri="{BB962C8B-B14F-4D97-AF65-F5344CB8AC3E}">
+        <p14:creationId xmlns:p14="http://schemas.microsoft.com/office/powerpoint/2010/main" val="4170998366"/>
+      </p:ext>
+    </p:extLst>
+  </p:cSld>
+  <p:clrMapOvr>
+    <a:masterClrMapping/>
+  </p:clrMapOvr>
+</p:notes>
+</file>
+
+<file path=ppt/notesSlides/notesSlide8.xml><?xml version="1.0" encoding="utf-8"?>
+<p:notes xmlns:a="http://schemas.openxmlformats.org/drawingml/2006/main" xmlns:r="http://schemas.openxmlformats.org/officeDocument/2006/relationships" xmlns:p="http://schemas.openxmlformats.org/presentationml/2006/main">
+  <p:cSld>
+    <p:spTree>
+      <p:nvGrpSpPr>
+        <p:cNvPr id="1" name=""/>
+        <p:cNvGrpSpPr/>
+        <p:nvPr/>
+      </p:nvGrpSpPr>
+      <p:grpSpPr>
+        <a:xfrm>
+          <a:off x="0" y="0"/>
+          <a:ext cx="0" cy="0"/>
+          <a:chOff x="0" y="0"/>
+          <a:chExt cx="0" cy="0"/>
+        </a:xfrm>
+      </p:grpSpPr>
+      <p:sp>
+        <p:nvSpPr>
+          <p:cNvPr id="2" name="Slide Image Placeholder 1"/>
+          <p:cNvSpPr>
+            <a:spLocks noGrp="1" noRot="1" noChangeAspect="1"/>
+          </p:cNvSpPr>
+          <p:nvPr>
+            <p:ph type="sldImg"/>
+          </p:nvPr>
+        </p:nvSpPr>
+        <p:spPr/>
+      </p:sp>
+      <p:sp>
+        <p:nvSpPr>
+          <p:cNvPr id="3" name="Notes Placeholder 2"/>
+          <p:cNvSpPr>
+            <a:spLocks noGrp="1"/>
+          </p:cNvSpPr>
+          <p:nvPr>
+            <p:ph type="body" idx="1"/>
+          </p:nvPr>
+        </p:nvSpPr>
+        <p:spPr/>
+        <p:txBody>
+          <a:bodyPr/>
+          <a:lstStyle/>
+          <a:p>
+            <a:r>
+              <a:rPr lang="en-US" dirty="0" smtClean="0"/>
+              <a:t>My friend</a:t>
+            </a:r>
+            <a:r>
+              <a:rPr lang="en-US" baseline="0" dirty="0" smtClean="0"/>
+              <a:t> is crazy</a:t>
+            </a:r>
+            <a:endParaRPr lang="en-US" dirty="0"/>
+          </a:p>
+        </p:txBody>
+      </p:sp>
+      <p:sp>
+        <p:nvSpPr>
+          <p:cNvPr id="4" name="Slide Number Placeholder 3"/>
+          <p:cNvSpPr>
+            <a:spLocks noGrp="1"/>
+          </p:cNvSpPr>
+          <p:nvPr>
+            <p:ph type="sldNum" sz="quarter" idx="10"/>
+          </p:nvPr>
+        </p:nvSpPr>
+        <p:spPr/>
+        <p:txBody>
+          <a:bodyPr/>
+          <a:lstStyle/>
+          <a:p>
+            <a:fld id="{02BCBBC8-CD0A-A54F-B7AC-46686CC7898C}" type="slidenum">
+              <a:rPr lang="en-US" smtClean="0"/>
+              <a:t>10</a:t>
+            </a:fld>
+            <a:endParaRPr lang="en-US"/>
+          </a:p>
+        </p:txBody>
+      </p:sp>
+    </p:spTree>
+    <p:extLst>
+      <p:ext uri="{BB962C8B-B14F-4D97-AF65-F5344CB8AC3E}">
+        <p14:creationId xmlns:p14="http://schemas.microsoft.com/office/powerpoint/2010/main" val="1161597414"/>
+      </p:ext>
+    </p:extLst>
+  </p:cSld>
+  <p:clrMapOvr>
+    <a:masterClrMapping/>
+  </p:clrMapOvr>
+</p:notes>
+</file>
+
+<file path=ppt/notesSlides/notesSlide9.xml><?xml version="1.0" encoding="utf-8"?>
+<p:notes xmlns:a="http://schemas.openxmlformats.org/drawingml/2006/main" xmlns:r="http://schemas.openxmlformats.org/officeDocument/2006/relationships" xmlns:p="http://schemas.openxmlformats.org/presentationml/2006/main">
+  <p:cSld>
+    <p:spTree>
+      <p:nvGrpSpPr>
+        <p:cNvPr id="1" name=""/>
+        <p:cNvGrpSpPr/>
+        <p:nvPr/>
+      </p:nvGrpSpPr>
+      <p:grpSpPr>
+        <a:xfrm>
+          <a:off x="0" y="0"/>
+          <a:ext cx="0" cy="0"/>
+          <a:chOff x="0" y="0"/>
+          <a:chExt cx="0" cy="0"/>
+        </a:xfrm>
+      </p:grpSpPr>
+      <p:sp>
+        <p:nvSpPr>
+          <p:cNvPr id="2" name="Slide Image Placeholder 1"/>
+          <p:cNvSpPr>
+            <a:spLocks noGrp="1" noRot="1" noChangeAspect="1"/>
+          </p:cNvSpPr>
+          <p:nvPr>
+            <p:ph type="sldImg"/>
+          </p:nvPr>
+        </p:nvSpPr>
+        <p:spPr/>
+      </p:sp>
+      <p:sp>
+        <p:nvSpPr>
+          <p:cNvPr id="3" name="Notes Placeholder 2"/>
+          <p:cNvSpPr>
+            <a:spLocks noGrp="1"/>
+          </p:cNvSpPr>
+          <p:nvPr>
+            <p:ph type="body" idx="1"/>
+          </p:nvPr>
+        </p:nvSpPr>
+        <p:spPr/>
+        <p:txBody>
+          <a:bodyPr/>
+          <a:lstStyle/>
+          <a:p>
+            <a:r>
+              <a:rPr lang="en-US" dirty="0" err="1" smtClean="0"/>
+              <a:t>Data.gov</a:t>
+            </a:r>
+            <a:endParaRPr lang="en-US" dirty="0" smtClean="0"/>
+          </a:p>
+          <a:p>
+            <a:r>
+              <a:rPr lang="en-US" dirty="0" err="1" smtClean="0"/>
+              <a:t>Worldbank</a:t>
+            </a:r>
+            <a:endParaRPr lang="en-US" dirty="0" smtClean="0"/>
+          </a:p>
+          <a:p>
+            <a:endParaRPr lang="en-US" dirty="0"/>
+          </a:p>
+        </p:txBody>
+      </p:sp>
+      <p:sp>
+        <p:nvSpPr>
+          <p:cNvPr id="4" name="Slide Number Placeholder 3"/>
+          <p:cNvSpPr>
+            <a:spLocks noGrp="1"/>
+          </p:cNvSpPr>
+          <p:nvPr>
+            <p:ph type="sldNum" sz="quarter" idx="10"/>
+          </p:nvPr>
+        </p:nvSpPr>
+        <p:spPr/>
+        <p:txBody>
+          <a:bodyPr/>
+          <a:lstStyle/>
+          <a:p>
+            <a:fld id="{02BCBBC8-CD0A-A54F-B7AC-46686CC7898C}" type="slidenum">
+              <a:rPr lang="en-US" smtClean="0"/>
+              <a:t>11</a:t>
+            </a:fld>
+            <a:endParaRPr lang="en-US"/>
+          </a:p>
+        </p:txBody>
+      </p:sp>
+    </p:spTree>
+    <p:extLst>
+      <p:ext uri="{BB962C8B-B14F-4D97-AF65-F5344CB8AC3E}">
+        <p14:creationId xmlns:p14="http://schemas.microsoft.com/office/powerpoint/2010/main" val="189958596"/>
       </p:ext>
     </p:extLst>
   </p:cSld>
@@ -4288,7 +4928,7 @@
           <p:nvPr/>
         </p:nvPicPr>
         <p:blipFill>
-          <a:blip r:embed="rId2"/>
+          <a:blip r:embed="rId3"/>
           <a:stretch>
             <a:fillRect/>
           </a:stretch>
@@ -4433,6 +5073,258 @@
     <p:extLst>
       <p:ext uri="{BB962C8B-B14F-4D97-AF65-F5344CB8AC3E}">
         <p14:creationId xmlns:p14="http://schemas.microsoft.com/office/powerpoint/2010/main" val="3994062808"/>
+      </p:ext>
+    </p:extLst>
+  </p:cSld>
+  <p:clrMapOvr>
+    <a:masterClrMapping/>
+  </p:clrMapOvr>
+  <p:timing>
+    <p:tnLst>
+      <p:par>
+        <p:cTn xmlns:p14="http://schemas.microsoft.com/office/powerpoint/2010/main" id="1" dur="indefinite" restart="never" nodeType="tmRoot"/>
+      </p:par>
+    </p:tnLst>
+  </p:timing>
+</p:sld>
+</file>
+
+<file path=ppt/slides/slide12.xml><?xml version="1.0" encoding="utf-8"?>
+<p:sld xmlns:a="http://schemas.openxmlformats.org/drawingml/2006/main" xmlns:r="http://schemas.openxmlformats.org/officeDocument/2006/relationships" xmlns:p="http://schemas.openxmlformats.org/presentationml/2006/main">
+  <p:cSld>
+    <p:bg>
+      <p:bgPr>
+        <a:solidFill>
+          <a:srgbClr val="D1A923"/>
+        </a:solidFill>
+        <a:effectLst/>
+      </p:bgPr>
+    </p:bg>
+    <p:spTree>
+      <p:nvGrpSpPr>
+        <p:cNvPr id="1" name=""/>
+        <p:cNvGrpSpPr/>
+        <p:nvPr/>
+      </p:nvGrpSpPr>
+      <p:grpSpPr>
+        <a:xfrm>
+          <a:off x="0" y="0"/>
+          <a:ext cx="0" cy="0"/>
+          <a:chOff x="0" y="0"/>
+          <a:chExt cx="0" cy="0"/>
+        </a:xfrm>
+      </p:grpSpPr>
+      <p:sp>
+        <p:nvSpPr>
+          <p:cNvPr id="2" name="Title 1"/>
+          <p:cNvSpPr>
+            <a:spLocks noGrp="1"/>
+          </p:cNvSpPr>
+          <p:nvPr>
+            <p:ph type="ctrTitle"/>
+          </p:nvPr>
+        </p:nvSpPr>
+        <p:spPr/>
+        <p:txBody>
+          <a:bodyPr>
+            <a:normAutofit fontScale="90000"/>
+          </a:bodyPr>
+          <a:lstStyle/>
+          <a:p>
+            <a:r>
+              <a:rPr lang="en-US" sz="6000" b="1" dirty="0" smtClean="0">
+                <a:solidFill>
+                  <a:schemeClr val="bg1"/>
+                </a:solidFill>
+                <a:latin typeface="Helvetica Neue"/>
+              </a:rPr>
+              <a:t>Data as a Public Good</a:t>
+            </a:r>
+            <a:endParaRPr lang="en-US" sz="6000" b="1" dirty="0">
+              <a:solidFill>
+                <a:schemeClr val="bg1"/>
+              </a:solidFill>
+              <a:latin typeface="Helvetica Neue"/>
+            </a:endParaRPr>
+          </a:p>
+        </p:txBody>
+      </p:sp>
+      <p:sp>
+        <p:nvSpPr>
+          <p:cNvPr id="3" name="Subtitle 2"/>
+          <p:cNvSpPr>
+            <a:spLocks noGrp="1"/>
+          </p:cNvSpPr>
+          <p:nvPr>
+            <p:ph type="subTitle" idx="1"/>
+          </p:nvPr>
+        </p:nvSpPr>
+        <p:spPr>
+          <a:xfrm>
+            <a:off x="2250830" y="3600450"/>
+            <a:ext cx="5537646" cy="1752600"/>
+          </a:xfrm>
+        </p:spPr>
+        <p:txBody>
+          <a:bodyPr>
+            <a:normAutofit/>
+          </a:bodyPr>
+          <a:lstStyle/>
+          <a:p>
+            <a:pPr algn="l"/>
+            <a:endParaRPr lang="en-US" sz="2800" dirty="0" smtClean="0">
+              <a:solidFill>
+                <a:schemeClr val="bg1">
+                  <a:lumMod val="85000"/>
+                </a:schemeClr>
+              </a:solidFill>
+              <a:latin typeface="Helvetica Neue"/>
+            </a:endParaRPr>
+          </a:p>
+          <a:p>
+            <a:pPr algn="l"/>
+            <a:endParaRPr lang="en-US" sz="2800" dirty="0" smtClean="0">
+              <a:latin typeface="Helvetica Neue"/>
+            </a:endParaRPr>
+          </a:p>
+          <a:p>
+            <a:pPr algn="l"/>
+            <a:endParaRPr lang="en-US" sz="2800" dirty="0">
+              <a:latin typeface="Helvetica Neue"/>
+            </a:endParaRPr>
+          </a:p>
+        </p:txBody>
+      </p:sp>
+    </p:spTree>
+    <p:extLst>
+      <p:ext uri="{BB962C8B-B14F-4D97-AF65-F5344CB8AC3E}">
+        <p14:creationId xmlns:p14="http://schemas.microsoft.com/office/powerpoint/2010/main" val="507253439"/>
+      </p:ext>
+    </p:extLst>
+  </p:cSld>
+  <p:clrMapOvr>
+    <a:masterClrMapping/>
+  </p:clrMapOvr>
+  <p:timing>
+    <p:tnLst>
+      <p:par>
+        <p:cTn xmlns:p14="http://schemas.microsoft.com/office/powerpoint/2010/main" id="1" dur="indefinite" restart="never" nodeType="tmRoot"/>
+      </p:par>
+    </p:tnLst>
+  </p:timing>
+</p:sld>
+</file>
+
+<file path=ppt/slides/slide13.xml><?xml version="1.0" encoding="utf-8"?>
+<p:sld xmlns:a="http://schemas.openxmlformats.org/drawingml/2006/main" xmlns:r="http://schemas.openxmlformats.org/officeDocument/2006/relationships" xmlns:p="http://schemas.openxmlformats.org/presentationml/2006/main">
+  <p:cSld>
+    <p:bg>
+      <p:bgPr>
+        <a:solidFill>
+          <a:srgbClr val="6F526A"/>
+        </a:solidFill>
+        <a:effectLst/>
+      </p:bgPr>
+    </p:bg>
+    <p:spTree>
+      <p:nvGrpSpPr>
+        <p:cNvPr id="1" name=""/>
+        <p:cNvGrpSpPr/>
+        <p:nvPr/>
+      </p:nvGrpSpPr>
+      <p:grpSpPr>
+        <a:xfrm>
+          <a:off x="0" y="0"/>
+          <a:ext cx="0" cy="0"/>
+          <a:chOff x="0" y="0"/>
+          <a:chExt cx="0" cy="0"/>
+        </a:xfrm>
+      </p:grpSpPr>
+      <p:sp>
+        <p:nvSpPr>
+          <p:cNvPr id="2" name="Title 1"/>
+          <p:cNvSpPr>
+            <a:spLocks noGrp="1"/>
+          </p:cNvSpPr>
+          <p:nvPr>
+            <p:ph type="ctrTitle"/>
+          </p:nvPr>
+        </p:nvSpPr>
+        <p:spPr/>
+        <p:txBody>
+          <a:bodyPr>
+            <a:normAutofit/>
+          </a:bodyPr>
+          <a:lstStyle/>
+          <a:p>
+            <a:r>
+              <a:rPr lang="en-US" sz="6000" b="1" dirty="0" smtClean="0">
+                <a:solidFill>
+                  <a:schemeClr val="bg1"/>
+                </a:solidFill>
+                <a:latin typeface="Helvetica Neue"/>
+              </a:rPr>
+              <a:t>Journalism?</a:t>
+            </a:r>
+            <a:endParaRPr lang="en-US" sz="6000" b="1" dirty="0">
+              <a:solidFill>
+                <a:schemeClr val="bg1"/>
+              </a:solidFill>
+              <a:latin typeface="Helvetica Neue"/>
+            </a:endParaRPr>
+          </a:p>
+        </p:txBody>
+      </p:sp>
+      <p:sp>
+        <p:nvSpPr>
+          <p:cNvPr id="3" name="Subtitle 2"/>
+          <p:cNvSpPr>
+            <a:spLocks noGrp="1"/>
+          </p:cNvSpPr>
+          <p:nvPr>
+            <p:ph type="subTitle" idx="1"/>
+          </p:nvPr>
+        </p:nvSpPr>
+        <p:spPr>
+          <a:xfrm>
+            <a:off x="2250830" y="3600450"/>
+            <a:ext cx="5537646" cy="1752600"/>
+          </a:xfrm>
+        </p:spPr>
+        <p:txBody>
+          <a:bodyPr>
+            <a:normAutofit/>
+          </a:bodyPr>
+          <a:lstStyle/>
+          <a:p>
+            <a:pPr algn="l"/>
+            <a:endParaRPr lang="en-US" sz="2800" dirty="0" smtClean="0">
+              <a:solidFill>
+                <a:schemeClr val="bg1">
+                  <a:lumMod val="85000"/>
+                </a:schemeClr>
+              </a:solidFill>
+              <a:latin typeface="Helvetica Neue"/>
+            </a:endParaRPr>
+          </a:p>
+          <a:p>
+            <a:pPr algn="l"/>
+            <a:endParaRPr lang="en-US" sz="2800" dirty="0" smtClean="0">
+              <a:latin typeface="Helvetica Neue"/>
+            </a:endParaRPr>
+          </a:p>
+          <a:p>
+            <a:pPr algn="l"/>
+            <a:endParaRPr lang="en-US" sz="2800" dirty="0">
+              <a:latin typeface="Helvetica Neue"/>
+            </a:endParaRPr>
+          </a:p>
+        </p:txBody>
+      </p:sp>
+    </p:spTree>
+    <p:extLst>
+      <p:ext uri="{BB962C8B-B14F-4D97-AF65-F5344CB8AC3E}">
+        <p14:creationId xmlns:p14="http://schemas.microsoft.com/office/powerpoint/2010/main" val="3776374908"/>
       </p:ext>
     </p:extLst>
   </p:cSld>

</xml_diff>